<commit_message>
Atualização do arquivo User Stories
</commit_message>
<xml_diff>
--- a/Ideação/Story Board/User Stories.pptx
+++ b/Ideação/Story Board/User Stories.pptx
@@ -6,6 +6,8 @@
   </p:sldMasterIdLst>
   <p:sldIdLst>
     <p:sldId id="256" r:id="rId5"/>
+    <p:sldId id="257" r:id="rId6"/>
+    <p:sldId id="258" r:id="rId7"/>
   </p:sldIdLst>
   <p:sldSz cx="12192000" cy="6858000"/>
   <p:notesSz cx="6858000" cy="9144000"/>
@@ -104,15 +106,12 @@
       </a:defRPr>
     </a:lvl9pPr>
   </p:defaultTextStyle>
+  <p:extLst>
+    <p:ext uri="{EFAFB233-063F-42B5-8137-9DF3F51BA10A}">
+      <p15:sldGuideLst xmlns:p15="http://schemas.microsoft.com/office/powerpoint/2012/main"/>
+    </p:ext>
+  </p:extLst>
 </p:presentation>
-</file>
-
-<file path=ppt/revisionInfo.xml><?xml version="1.0" encoding="utf-8"?>
-<p1510:revInfo xmlns:a="http://schemas.openxmlformats.org/drawingml/2006/main" xmlns:r="http://schemas.openxmlformats.org/officeDocument/2006/relationships" xmlns:p1510="http://schemas.microsoft.com/office/powerpoint/2015/10/main">
-  <p1510:revLst>
-    <p1510:client id="{B4A4EC2F-0AD6-46CA-9813-76572137C18A}" v="6" dt="2022-03-11T22:14:58.697"/>
-  </p1510:revLst>
-</p1510:revInfo>
 </file>
 
 <file path=ppt/slideLayouts/slideLayout1.xml><?xml version="1.0" encoding="utf-8"?>
@@ -262,7 +261,7 @@
           <a:p>
             <a:fld id="{FF510886-C572-4804-8F43-1CB06F629938}" type="datetimeFigureOut">
               <a:rPr lang="pt-BR" smtClean="0"/>
-              <a:t>11/03/2022</a:t>
+              <a:t>29/03/2022</a:t>
             </a:fld>
             <a:endParaRPr lang="pt-BR"/>
           </a:p>
@@ -460,7 +459,7 @@
           <a:p>
             <a:fld id="{FF510886-C572-4804-8F43-1CB06F629938}" type="datetimeFigureOut">
               <a:rPr lang="pt-BR" smtClean="0"/>
-              <a:t>11/03/2022</a:t>
+              <a:t>29/03/2022</a:t>
             </a:fld>
             <a:endParaRPr lang="pt-BR"/>
           </a:p>
@@ -668,7 +667,7 @@
           <a:p>
             <a:fld id="{FF510886-C572-4804-8F43-1CB06F629938}" type="datetimeFigureOut">
               <a:rPr lang="pt-BR" smtClean="0"/>
-              <a:t>11/03/2022</a:t>
+              <a:t>29/03/2022</a:t>
             </a:fld>
             <a:endParaRPr lang="pt-BR"/>
           </a:p>
@@ -866,7 +865,7 @@
           <a:p>
             <a:fld id="{FF510886-C572-4804-8F43-1CB06F629938}" type="datetimeFigureOut">
               <a:rPr lang="pt-BR" smtClean="0"/>
-              <a:t>11/03/2022</a:t>
+              <a:t>29/03/2022</a:t>
             </a:fld>
             <a:endParaRPr lang="pt-BR"/>
           </a:p>
@@ -1141,7 +1140,7 @@
           <a:p>
             <a:fld id="{FF510886-C572-4804-8F43-1CB06F629938}" type="datetimeFigureOut">
               <a:rPr lang="pt-BR" smtClean="0"/>
-              <a:t>11/03/2022</a:t>
+              <a:t>29/03/2022</a:t>
             </a:fld>
             <a:endParaRPr lang="pt-BR"/>
           </a:p>
@@ -1406,7 +1405,7 @@
           <a:p>
             <a:fld id="{FF510886-C572-4804-8F43-1CB06F629938}" type="datetimeFigureOut">
               <a:rPr lang="pt-BR" smtClean="0"/>
-              <a:t>11/03/2022</a:t>
+              <a:t>29/03/2022</a:t>
             </a:fld>
             <a:endParaRPr lang="pt-BR"/>
           </a:p>
@@ -1818,7 +1817,7 @@
           <a:p>
             <a:fld id="{FF510886-C572-4804-8F43-1CB06F629938}" type="datetimeFigureOut">
               <a:rPr lang="pt-BR" smtClean="0"/>
-              <a:t>11/03/2022</a:t>
+              <a:t>29/03/2022</a:t>
             </a:fld>
             <a:endParaRPr lang="pt-BR"/>
           </a:p>
@@ -1959,7 +1958,7 @@
           <a:p>
             <a:fld id="{FF510886-C572-4804-8F43-1CB06F629938}" type="datetimeFigureOut">
               <a:rPr lang="pt-BR" smtClean="0"/>
-              <a:t>11/03/2022</a:t>
+              <a:t>29/03/2022</a:t>
             </a:fld>
             <a:endParaRPr lang="pt-BR"/>
           </a:p>
@@ -2072,7 +2071,7 @@
           <a:p>
             <a:fld id="{FF510886-C572-4804-8F43-1CB06F629938}" type="datetimeFigureOut">
               <a:rPr lang="pt-BR" smtClean="0"/>
-              <a:t>11/03/2022</a:t>
+              <a:t>29/03/2022</a:t>
             </a:fld>
             <a:endParaRPr lang="pt-BR"/>
           </a:p>
@@ -2383,7 +2382,7 @@
           <a:p>
             <a:fld id="{FF510886-C572-4804-8F43-1CB06F629938}" type="datetimeFigureOut">
               <a:rPr lang="pt-BR" smtClean="0"/>
-              <a:t>11/03/2022</a:t>
+              <a:t>29/03/2022</a:t>
             </a:fld>
             <a:endParaRPr lang="pt-BR"/>
           </a:p>
@@ -2671,7 +2670,7 @@
           <a:p>
             <a:fld id="{FF510886-C572-4804-8F43-1CB06F629938}" type="datetimeFigureOut">
               <a:rPr lang="pt-BR" smtClean="0"/>
-              <a:t>11/03/2022</a:t>
+              <a:t>29/03/2022</a:t>
             </a:fld>
             <a:endParaRPr lang="pt-BR"/>
           </a:p>
@@ -2912,7 +2911,7 @@
           <a:p>
             <a:fld id="{FF510886-C572-4804-8F43-1CB06F629938}" type="datetimeFigureOut">
               <a:rPr lang="pt-BR" smtClean="0"/>
-              <a:t>11/03/2022</a:t>
+              <a:t>29/03/2022</a:t>
             </a:fld>
             <a:endParaRPr lang="pt-BR"/>
           </a:p>
@@ -3387,7 +3386,7 @@
         <p:spPr>
           <a:xfrm>
             <a:off x="441422" y="1248508"/>
-            <a:ext cx="2968284" cy="2180491"/>
+            <a:ext cx="3125804" cy="2528361"/>
           </a:xfrm>
           <a:prstGeom prst="roundRect">
             <a:avLst/>
@@ -3451,7 +3450,7 @@
                 </a:solidFill>
                 <a:latin typeface="Comic Sans MS" panose="030F0702030302020204" pitchFamily="66" charset="0"/>
               </a:rPr>
-              <a:t>Eu com Administrador necessito da localização exata da onde está ocorrendo o problema em um mapa no dashboard para que tomar uma decisão mais assertiva</a:t>
+              <a:t>Eu com Administrador necessito da localização exata da onde está ocorrendo o problema em um mapa e uma dashboard para que tomar uma decisão mais assertiva</a:t>
             </a:r>
             <a:r>
               <a:rPr lang="pt-BR" sz="1600" dirty="0">
@@ -3488,7 +3487,7 @@
         <p:spPr>
           <a:xfrm>
             <a:off x="4413521" y="1248509"/>
-            <a:ext cx="3364956" cy="2180491"/>
+            <a:ext cx="3869088" cy="2528361"/>
           </a:xfrm>
           <a:prstGeom prst="roundRect">
             <a:avLst/>
@@ -3552,7 +3551,7 @@
                 </a:solidFill>
                 <a:latin typeface="Comic Sans MS" panose="030F0702030302020204" pitchFamily="66" charset="0"/>
               </a:rPr>
-              <a:t>Eu com Administrador necessito de alertas visualiza rapidamente há ocorrência e ver detalhes do problema para poder notificar o suporte com as inscrições especificado problema.</a:t>
+              <a:t>Eu com Administrador necessito de alertas para  visualiza rapidamente se há ocorrência e ver detalhes do problema para poder notificar o suporte com as inscrições especificado problema.</a:t>
             </a:r>
           </a:p>
           <a:p>
@@ -3580,7 +3579,7 @@
         <p:spPr>
           <a:xfrm>
             <a:off x="8624772" y="1259061"/>
-            <a:ext cx="3364956" cy="2180491"/>
+            <a:ext cx="3421454" cy="2528361"/>
           </a:xfrm>
           <a:prstGeom prst="roundRect">
             <a:avLst/>
@@ -3644,7 +3643,7 @@
                 </a:solidFill>
                 <a:latin typeface="Comic Sans MS" panose="030F0702030302020204" pitchFamily="66" charset="0"/>
               </a:rPr>
-              <a:t>Eu com Administrador necessito histórico de registros com local e identificação da maquina para poder fazer relatórios de maquinas onde mais ocorrem chamados.</a:t>
+              <a:t>Eu com Administrador necessito histórico de registros com local e identificação da maquina para poder fazer relatórios das mesma onde mais ocorrem chamados.</a:t>
             </a:r>
           </a:p>
           <a:p>
@@ -3845,7 +3844,7 @@
         <p:spPr>
           <a:xfrm>
             <a:off x="8792629" y="4154658"/>
-            <a:ext cx="3029241" cy="2180491"/>
+            <a:ext cx="3253597" cy="2378664"/>
           </a:xfrm>
           <a:prstGeom prst="roundRect">
             <a:avLst/>
@@ -3909,7 +3908,7 @@
                 </a:solidFill>
                 <a:latin typeface="Comic Sans MS" panose="030F0702030302020204" pitchFamily="66" charset="0"/>
               </a:rPr>
-              <a:t>Eu com necessário que  o mapa me mostra a minha localização atual até a localização do chamado para eu poder chegar com rapidez local. </a:t>
+              <a:t>Eu como suporte é necessário que  o mapa me mostra a minha localização atual até a localização do chamado para eu poder chegar com rapidez local. </a:t>
             </a:r>
             <a:endParaRPr lang="pt-BR" dirty="0">
               <a:solidFill>
@@ -3923,6 +3922,1084 @@
     <p:extLst>
       <p:ext uri="{BB962C8B-B14F-4D97-AF65-F5344CB8AC3E}">
         <p14:creationId xmlns:p14="http://schemas.microsoft.com/office/powerpoint/2010/main" val="1951850598"/>
+      </p:ext>
+    </p:extLst>
+  </p:cSld>
+  <p:clrMapOvr>
+    <a:masterClrMapping/>
+  </p:clrMapOvr>
+</p:sld>
+</file>
+
+<file path=ppt/slides/slide2.xml><?xml version="1.0" encoding="utf-8"?>
+<p:sld xmlns:a="http://schemas.openxmlformats.org/drawingml/2006/main" xmlns:r="http://schemas.openxmlformats.org/officeDocument/2006/relationships" xmlns:p="http://schemas.openxmlformats.org/presentationml/2006/main">
+  <p:cSld>
+    <p:spTree>
+      <p:nvGrpSpPr>
+        <p:cNvPr id="1" name=""/>
+        <p:cNvGrpSpPr/>
+        <p:nvPr/>
+      </p:nvGrpSpPr>
+      <p:grpSpPr>
+        <a:xfrm>
+          <a:off x="0" y="0"/>
+          <a:ext cx="0" cy="0"/>
+          <a:chOff x="0" y="0"/>
+          <a:chExt cx="0" cy="0"/>
+        </a:xfrm>
+      </p:grpSpPr>
+      <p:sp>
+        <p:nvSpPr>
+          <p:cNvPr id="2" name="Retângulo: Cantos Arredondados 1">
+            <a:extLst>
+              <a:ext uri="{FF2B5EF4-FFF2-40B4-BE49-F238E27FC236}">
+                <a16:creationId xmlns:a16="http://schemas.microsoft.com/office/drawing/2014/main" id="{3B887D0C-64A4-4E35-9C2B-B531B4F9C578}"/>
+              </a:ext>
+            </a:extLst>
+          </p:cNvPr>
+          <p:cNvSpPr/>
+          <p:nvPr/>
+        </p:nvSpPr>
+        <p:spPr>
+          <a:xfrm>
+            <a:off x="242639" y="241342"/>
+            <a:ext cx="3030648" cy="2316327"/>
+          </a:xfrm>
+          <a:prstGeom prst="roundRect">
+            <a:avLst/>
+          </a:prstGeom>
+          <a:solidFill>
+            <a:schemeClr val="bg1"/>
+          </a:solidFill>
+          <a:ln w="38100">
+            <a:solidFill>
+              <a:srgbClr val="37A8E9"/>
+            </a:solidFill>
+          </a:ln>
+        </p:spPr>
+        <p:style>
+          <a:lnRef idx="2">
+            <a:schemeClr val="accent1">
+              <a:shade val="50000"/>
+            </a:schemeClr>
+          </a:lnRef>
+          <a:fillRef idx="1">
+            <a:schemeClr val="accent1"/>
+          </a:fillRef>
+          <a:effectRef idx="0">
+            <a:schemeClr val="accent1"/>
+          </a:effectRef>
+          <a:fontRef idx="minor">
+            <a:schemeClr val="lt1"/>
+          </a:fontRef>
+        </p:style>
+        <p:txBody>
+          <a:bodyPr rtlCol="0" anchor="ctr"/>
+          <a:lstStyle/>
+          <a:p>
+            <a:pPr algn="ctr"/>
+            <a:endParaRPr lang="pt-BR" dirty="0">
+              <a:solidFill>
+                <a:schemeClr val="tx1"/>
+              </a:solidFill>
+            </a:endParaRPr>
+          </a:p>
+          <a:p>
+            <a:r>
+              <a:rPr lang="pt-BR" dirty="0">
+                <a:solidFill>
+                  <a:schemeClr val="tx1"/>
+                </a:solidFill>
+                <a:latin typeface="Comic Sans MS" panose="030F0702030302020204" pitchFamily="66" charset="0"/>
+              </a:rPr>
+              <a:t>#7</a:t>
+            </a:r>
+          </a:p>
+          <a:p>
+            <a:pPr algn="ctr"/>
+            <a:r>
+              <a:rPr lang="pt-BR" b="0" i="0" dirty="0">
+                <a:solidFill>
+                  <a:srgbClr val="000000"/>
+                </a:solidFill>
+                <a:effectLst/>
+                <a:latin typeface="Calibri" panose="020F0502020204030204" pitchFamily="34" charset="0"/>
+              </a:rPr>
+              <a:t>Eu como Suporte, preciso de um sistema que informe logs de erros, para que eu possa encontrar uma solução para o problema de forma eficiente.</a:t>
+            </a:r>
+            <a:endParaRPr lang="pt-BR" dirty="0">
+              <a:solidFill>
+                <a:schemeClr val="tx1"/>
+              </a:solidFill>
+            </a:endParaRPr>
+          </a:p>
+        </p:txBody>
+      </p:sp>
+      <p:sp>
+        <p:nvSpPr>
+          <p:cNvPr id="3" name="Retângulo: Cantos Arredondados 2">
+            <a:extLst>
+              <a:ext uri="{FF2B5EF4-FFF2-40B4-BE49-F238E27FC236}">
+                <a16:creationId xmlns:a16="http://schemas.microsoft.com/office/drawing/2014/main" id="{FAB38A0B-6D3A-4760-91E8-2950B7454A65}"/>
+              </a:ext>
+            </a:extLst>
+          </p:cNvPr>
+          <p:cNvSpPr/>
+          <p:nvPr/>
+        </p:nvSpPr>
+        <p:spPr>
+          <a:xfrm>
+            <a:off x="3668327" y="244145"/>
+            <a:ext cx="4137203" cy="2316327"/>
+          </a:xfrm>
+          <a:prstGeom prst="roundRect">
+            <a:avLst/>
+          </a:prstGeom>
+          <a:solidFill>
+            <a:schemeClr val="bg1"/>
+          </a:solidFill>
+          <a:ln w="38100">
+            <a:solidFill>
+              <a:srgbClr val="37A8E9"/>
+            </a:solidFill>
+          </a:ln>
+        </p:spPr>
+        <p:style>
+          <a:lnRef idx="2">
+            <a:schemeClr val="accent1">
+              <a:shade val="50000"/>
+            </a:schemeClr>
+          </a:lnRef>
+          <a:fillRef idx="1">
+            <a:schemeClr val="accent1"/>
+          </a:fillRef>
+          <a:effectRef idx="0">
+            <a:schemeClr val="accent1"/>
+          </a:effectRef>
+          <a:fontRef idx="minor">
+            <a:schemeClr val="lt1"/>
+          </a:fontRef>
+        </p:style>
+        <p:txBody>
+          <a:bodyPr rtlCol="0" anchor="ctr"/>
+          <a:lstStyle/>
+          <a:p>
+            <a:pPr algn="ctr"/>
+            <a:endParaRPr lang="pt-BR" dirty="0">
+              <a:solidFill>
+                <a:schemeClr val="tx1"/>
+              </a:solidFill>
+            </a:endParaRPr>
+          </a:p>
+          <a:p>
+            <a:r>
+              <a:rPr lang="pt-BR" dirty="0">
+                <a:solidFill>
+                  <a:schemeClr val="tx1"/>
+                </a:solidFill>
+                <a:latin typeface="Comic Sans MS" panose="030F0702030302020204" pitchFamily="66" charset="0"/>
+              </a:rPr>
+              <a:t>#8</a:t>
+            </a:r>
+          </a:p>
+          <a:p>
+            <a:pPr algn="ctr"/>
+            <a:r>
+              <a:rPr lang="pt-BR" b="0" i="0" dirty="0">
+                <a:solidFill>
+                  <a:srgbClr val="000000"/>
+                </a:solidFill>
+                <a:effectLst/>
+                <a:latin typeface="Calibri" panose="020F0502020204030204" pitchFamily="34" charset="0"/>
+              </a:rPr>
+              <a:t>Eu, como Administrador da Estação de metro, preciso de uma informação do status de atendimento da máquina, para saber se o suporte está a caminho, se será resolvido no futuro ou se ainda não tem prazo de solução</a:t>
+            </a:r>
+            <a:endParaRPr lang="pt-BR" dirty="0">
+              <a:solidFill>
+                <a:schemeClr val="tx1"/>
+              </a:solidFill>
+            </a:endParaRPr>
+          </a:p>
+        </p:txBody>
+      </p:sp>
+      <p:sp>
+        <p:nvSpPr>
+          <p:cNvPr id="6" name="Retângulo: Cantos Arredondados 5">
+            <a:extLst>
+              <a:ext uri="{FF2B5EF4-FFF2-40B4-BE49-F238E27FC236}">
+                <a16:creationId xmlns:a16="http://schemas.microsoft.com/office/drawing/2014/main" id="{A1781199-8B3D-4B68-932D-B35A37918984}"/>
+              </a:ext>
+            </a:extLst>
+          </p:cNvPr>
+          <p:cNvSpPr/>
+          <p:nvPr/>
+        </p:nvSpPr>
+        <p:spPr>
+          <a:xfrm>
+            <a:off x="8200569" y="241342"/>
+            <a:ext cx="3554109" cy="2316327"/>
+          </a:xfrm>
+          <a:prstGeom prst="roundRect">
+            <a:avLst/>
+          </a:prstGeom>
+          <a:solidFill>
+            <a:schemeClr val="bg1"/>
+          </a:solidFill>
+          <a:ln w="38100">
+            <a:solidFill>
+              <a:srgbClr val="37A8E9"/>
+            </a:solidFill>
+          </a:ln>
+        </p:spPr>
+        <p:style>
+          <a:lnRef idx="2">
+            <a:schemeClr val="accent1">
+              <a:shade val="50000"/>
+            </a:schemeClr>
+          </a:lnRef>
+          <a:fillRef idx="1">
+            <a:schemeClr val="accent1"/>
+          </a:fillRef>
+          <a:effectRef idx="0">
+            <a:schemeClr val="accent1"/>
+          </a:effectRef>
+          <a:fontRef idx="minor">
+            <a:schemeClr val="lt1"/>
+          </a:fontRef>
+        </p:style>
+        <p:txBody>
+          <a:bodyPr rtlCol="0" anchor="ctr"/>
+          <a:lstStyle/>
+          <a:p>
+            <a:pPr algn="ctr"/>
+            <a:endParaRPr lang="pt-BR" dirty="0">
+              <a:solidFill>
+                <a:schemeClr val="tx1"/>
+              </a:solidFill>
+            </a:endParaRPr>
+          </a:p>
+          <a:p>
+            <a:r>
+              <a:rPr lang="pt-BR" dirty="0">
+                <a:solidFill>
+                  <a:schemeClr val="tx1"/>
+                </a:solidFill>
+                <a:latin typeface="Comic Sans MS" panose="030F0702030302020204" pitchFamily="66" charset="0"/>
+              </a:rPr>
+              <a:t>#9</a:t>
+            </a:r>
+          </a:p>
+          <a:p>
+            <a:pPr algn="ctr"/>
+            <a:r>
+              <a:rPr lang="pt-BR" b="0" i="0" dirty="0">
+                <a:solidFill>
+                  <a:srgbClr val="000000"/>
+                </a:solidFill>
+                <a:effectLst/>
+                <a:latin typeface="Calibri" panose="020F0502020204030204" pitchFamily="34" charset="0"/>
+              </a:rPr>
+              <a:t>Eu, como </a:t>
+            </a:r>
+            <a:r>
+              <a:rPr lang="pt-BR" b="0" i="0" dirty="0" err="1">
+                <a:solidFill>
+                  <a:srgbClr val="000000"/>
+                </a:solidFill>
+                <a:effectLst/>
+                <a:latin typeface="Calibri" panose="020F0502020204030204" pitchFamily="34" charset="0"/>
+              </a:rPr>
+              <a:t>Adm</a:t>
+            </a:r>
+            <a:r>
+              <a:rPr lang="pt-BR" b="0" i="0" dirty="0">
+                <a:solidFill>
+                  <a:srgbClr val="000000"/>
+                </a:solidFill>
+                <a:effectLst/>
+                <a:latin typeface="Calibri" panose="020F0502020204030204" pitchFamily="34" charset="0"/>
+              </a:rPr>
+              <a:t>, prefiro que nossos totens rodem em maquinas virtuais, para evitar problemas com hardware local</a:t>
+            </a:r>
+            <a:endParaRPr lang="pt-BR" dirty="0">
+              <a:solidFill>
+                <a:schemeClr val="tx1"/>
+              </a:solidFill>
+              <a:latin typeface="Comic Sans MS" panose="030F0702030302020204" pitchFamily="66" charset="0"/>
+            </a:endParaRPr>
+          </a:p>
+        </p:txBody>
+      </p:sp>
+      <p:sp>
+        <p:nvSpPr>
+          <p:cNvPr id="9" name="Retângulo: Cantos Arredondados 8">
+            <a:extLst>
+              <a:ext uri="{FF2B5EF4-FFF2-40B4-BE49-F238E27FC236}">
+                <a16:creationId xmlns:a16="http://schemas.microsoft.com/office/drawing/2014/main" id="{E8FC0A76-EF25-420E-B923-570D30D03D62}"/>
+              </a:ext>
+            </a:extLst>
+          </p:cNvPr>
+          <p:cNvSpPr/>
+          <p:nvPr/>
+        </p:nvSpPr>
+        <p:spPr>
+          <a:xfrm>
+            <a:off x="242639" y="2951413"/>
+            <a:ext cx="4137203" cy="2316327"/>
+          </a:xfrm>
+          <a:prstGeom prst="roundRect">
+            <a:avLst/>
+          </a:prstGeom>
+          <a:solidFill>
+            <a:schemeClr val="bg1"/>
+          </a:solidFill>
+          <a:ln w="38100">
+            <a:solidFill>
+              <a:srgbClr val="37A8E9"/>
+            </a:solidFill>
+          </a:ln>
+        </p:spPr>
+        <p:style>
+          <a:lnRef idx="2">
+            <a:schemeClr val="accent1">
+              <a:shade val="50000"/>
+            </a:schemeClr>
+          </a:lnRef>
+          <a:fillRef idx="1">
+            <a:schemeClr val="accent1"/>
+          </a:fillRef>
+          <a:effectRef idx="0">
+            <a:schemeClr val="accent1"/>
+          </a:effectRef>
+          <a:fontRef idx="minor">
+            <a:schemeClr val="lt1"/>
+          </a:fontRef>
+        </p:style>
+        <p:txBody>
+          <a:bodyPr rtlCol="0" anchor="ctr"/>
+          <a:lstStyle/>
+          <a:p>
+            <a:pPr algn="ctr"/>
+            <a:endParaRPr lang="pt-BR" dirty="0">
+              <a:solidFill>
+                <a:schemeClr val="tx1"/>
+              </a:solidFill>
+            </a:endParaRPr>
+          </a:p>
+          <a:p>
+            <a:r>
+              <a:rPr lang="pt-BR" dirty="0">
+                <a:solidFill>
+                  <a:schemeClr val="tx1"/>
+                </a:solidFill>
+                <a:latin typeface="Comic Sans MS" panose="030F0702030302020204" pitchFamily="66" charset="0"/>
+              </a:rPr>
+              <a:t>#10</a:t>
+            </a:r>
+          </a:p>
+          <a:p>
+            <a:pPr algn="ctr"/>
+            <a:r>
+              <a:rPr lang="pt-BR" b="0" i="0" dirty="0">
+                <a:solidFill>
+                  <a:srgbClr val="000000"/>
+                </a:solidFill>
+                <a:effectLst/>
+                <a:latin typeface="Calibri" panose="020F0502020204030204" pitchFamily="34" charset="0"/>
+              </a:rPr>
+              <a:t>Eu como administrador, necessito saber qual demanda é a mais urgente e que precisa de uma prioridade maior, para direcionar melhor os colaboradores em suas tarefas</a:t>
+            </a:r>
+            <a:endParaRPr lang="pt-BR" dirty="0">
+              <a:solidFill>
+                <a:schemeClr val="tx1"/>
+              </a:solidFill>
+              <a:latin typeface="Comic Sans MS" panose="030F0702030302020204" pitchFamily="66" charset="0"/>
+            </a:endParaRPr>
+          </a:p>
+        </p:txBody>
+      </p:sp>
+      <p:sp>
+        <p:nvSpPr>
+          <p:cNvPr id="10" name="Retângulo: Cantos Arredondados 9">
+            <a:extLst>
+              <a:ext uri="{FF2B5EF4-FFF2-40B4-BE49-F238E27FC236}">
+                <a16:creationId xmlns:a16="http://schemas.microsoft.com/office/drawing/2014/main" id="{F6AA62DE-8289-4489-93B5-44173FDC1D7B}"/>
+              </a:ext>
+            </a:extLst>
+          </p:cNvPr>
+          <p:cNvSpPr/>
+          <p:nvPr/>
+        </p:nvSpPr>
+        <p:spPr>
+          <a:xfrm>
+            <a:off x="4675492" y="2951412"/>
+            <a:ext cx="3395082" cy="2316327"/>
+          </a:xfrm>
+          <a:prstGeom prst="roundRect">
+            <a:avLst/>
+          </a:prstGeom>
+          <a:solidFill>
+            <a:schemeClr val="bg1"/>
+          </a:solidFill>
+          <a:ln w="38100">
+            <a:solidFill>
+              <a:srgbClr val="37A8E9"/>
+            </a:solidFill>
+          </a:ln>
+        </p:spPr>
+        <p:style>
+          <a:lnRef idx="2">
+            <a:schemeClr val="accent1">
+              <a:shade val="50000"/>
+            </a:schemeClr>
+          </a:lnRef>
+          <a:fillRef idx="1">
+            <a:schemeClr val="accent1"/>
+          </a:fillRef>
+          <a:effectRef idx="0">
+            <a:schemeClr val="accent1"/>
+          </a:effectRef>
+          <a:fontRef idx="minor">
+            <a:schemeClr val="lt1"/>
+          </a:fontRef>
+        </p:style>
+        <p:txBody>
+          <a:bodyPr rtlCol="0" anchor="ctr"/>
+          <a:lstStyle/>
+          <a:p>
+            <a:pPr algn="ctr"/>
+            <a:endParaRPr lang="pt-BR" dirty="0">
+              <a:solidFill>
+                <a:schemeClr val="tx1"/>
+              </a:solidFill>
+            </a:endParaRPr>
+          </a:p>
+          <a:p>
+            <a:r>
+              <a:rPr lang="pt-BR" dirty="0">
+                <a:solidFill>
+                  <a:schemeClr val="tx1"/>
+                </a:solidFill>
+                <a:latin typeface="Comic Sans MS" panose="030F0702030302020204" pitchFamily="66" charset="0"/>
+              </a:rPr>
+              <a:t>#11</a:t>
+            </a:r>
+          </a:p>
+          <a:p>
+            <a:pPr algn="ctr"/>
+            <a:r>
+              <a:rPr lang="pt-BR" b="0" i="0" dirty="0">
+                <a:solidFill>
+                  <a:srgbClr val="000000"/>
+                </a:solidFill>
+                <a:effectLst/>
+                <a:latin typeface="Calibri" panose="020F0502020204030204" pitchFamily="34" charset="0"/>
+              </a:rPr>
+              <a:t>Eu como suporte, necessito de uma descrição mais detalhada do problema para encontrar uma solução de forma mais rápida e eficiente</a:t>
+            </a:r>
+            <a:endParaRPr lang="pt-BR" dirty="0">
+              <a:solidFill>
+                <a:schemeClr val="tx1"/>
+              </a:solidFill>
+              <a:latin typeface="Comic Sans MS" panose="030F0702030302020204" pitchFamily="66" charset="0"/>
+            </a:endParaRPr>
+          </a:p>
+        </p:txBody>
+      </p:sp>
+      <p:sp>
+        <p:nvSpPr>
+          <p:cNvPr id="11" name="Retângulo: Cantos Arredondados 10">
+            <a:extLst>
+              <a:ext uri="{FF2B5EF4-FFF2-40B4-BE49-F238E27FC236}">
+                <a16:creationId xmlns:a16="http://schemas.microsoft.com/office/drawing/2014/main" id="{51A34366-0D07-44AA-972D-23D7C44EB36D}"/>
+              </a:ext>
+            </a:extLst>
+          </p:cNvPr>
+          <p:cNvSpPr/>
+          <p:nvPr/>
+        </p:nvSpPr>
+        <p:spPr>
+          <a:xfrm>
+            <a:off x="8462299" y="2951412"/>
+            <a:ext cx="3487062" cy="2316327"/>
+          </a:xfrm>
+          <a:prstGeom prst="roundRect">
+            <a:avLst/>
+          </a:prstGeom>
+          <a:solidFill>
+            <a:schemeClr val="bg1"/>
+          </a:solidFill>
+          <a:ln w="38100">
+            <a:solidFill>
+              <a:srgbClr val="37A8E9"/>
+            </a:solidFill>
+          </a:ln>
+        </p:spPr>
+        <p:style>
+          <a:lnRef idx="2">
+            <a:schemeClr val="accent1">
+              <a:shade val="50000"/>
+            </a:schemeClr>
+          </a:lnRef>
+          <a:fillRef idx="1">
+            <a:schemeClr val="accent1"/>
+          </a:fillRef>
+          <a:effectRef idx="0">
+            <a:schemeClr val="accent1"/>
+          </a:effectRef>
+          <a:fontRef idx="minor">
+            <a:schemeClr val="lt1"/>
+          </a:fontRef>
+        </p:style>
+        <p:txBody>
+          <a:bodyPr rtlCol="0" anchor="ctr"/>
+          <a:lstStyle/>
+          <a:p>
+            <a:pPr algn="ctr"/>
+            <a:endParaRPr lang="pt-BR" dirty="0">
+              <a:solidFill>
+                <a:schemeClr val="tx1"/>
+              </a:solidFill>
+            </a:endParaRPr>
+          </a:p>
+          <a:p>
+            <a:r>
+              <a:rPr lang="pt-BR" dirty="0">
+                <a:solidFill>
+                  <a:schemeClr val="tx1"/>
+                </a:solidFill>
+                <a:latin typeface="Comic Sans MS" panose="030F0702030302020204" pitchFamily="66" charset="0"/>
+              </a:rPr>
+              <a:t>#12</a:t>
+            </a:r>
+          </a:p>
+          <a:p>
+            <a:pPr algn="ctr"/>
+            <a:r>
+              <a:rPr lang="pt-BR" b="0" i="0" dirty="0">
+                <a:solidFill>
+                  <a:srgbClr val="000000"/>
+                </a:solidFill>
+                <a:effectLst/>
+                <a:latin typeface="Calibri" panose="020F0502020204030204" pitchFamily="34" charset="0"/>
+              </a:rPr>
+              <a:t>Eu como usuário do totem, necessito de uma confirmação por </a:t>
+            </a:r>
+            <a:r>
+              <a:rPr lang="pt-BR" b="0" i="0" dirty="0" err="1">
+                <a:solidFill>
+                  <a:srgbClr val="000000"/>
+                </a:solidFill>
+                <a:effectLst/>
+                <a:latin typeface="Calibri" panose="020F0502020204030204" pitchFamily="34" charset="0"/>
+              </a:rPr>
+              <a:t>whatsapp</a:t>
+            </a:r>
+            <a:r>
+              <a:rPr lang="pt-BR" b="0" i="0" dirty="0">
+                <a:solidFill>
+                  <a:srgbClr val="000000"/>
+                </a:solidFill>
+                <a:effectLst/>
+                <a:latin typeface="Calibri" panose="020F0502020204030204" pitchFamily="34" charset="0"/>
+              </a:rPr>
+              <a:t> ou SMS para saber se a minha compra ou recarga do bilhete foi efetuada com sucesso</a:t>
+            </a:r>
+            <a:endParaRPr lang="pt-BR" dirty="0">
+              <a:solidFill>
+                <a:schemeClr val="tx1"/>
+              </a:solidFill>
+              <a:latin typeface="Comic Sans MS" panose="030F0702030302020204" pitchFamily="66" charset="0"/>
+            </a:endParaRPr>
+          </a:p>
+        </p:txBody>
+      </p:sp>
+    </p:spTree>
+    <p:extLst>
+      <p:ext uri="{BB962C8B-B14F-4D97-AF65-F5344CB8AC3E}">
+        <p14:creationId xmlns:p14="http://schemas.microsoft.com/office/powerpoint/2010/main" val="2553378452"/>
+      </p:ext>
+    </p:extLst>
+  </p:cSld>
+  <p:clrMapOvr>
+    <a:masterClrMapping/>
+  </p:clrMapOvr>
+</p:sld>
+</file>
+
+<file path=ppt/slides/slide3.xml><?xml version="1.0" encoding="utf-8"?>
+<p:sld xmlns:a="http://schemas.openxmlformats.org/drawingml/2006/main" xmlns:r="http://schemas.openxmlformats.org/officeDocument/2006/relationships" xmlns:p="http://schemas.openxmlformats.org/presentationml/2006/main">
+  <p:cSld>
+    <p:spTree>
+      <p:nvGrpSpPr>
+        <p:cNvPr id="1" name=""/>
+        <p:cNvGrpSpPr/>
+        <p:nvPr/>
+      </p:nvGrpSpPr>
+      <p:grpSpPr>
+        <a:xfrm>
+          <a:off x="0" y="0"/>
+          <a:ext cx="0" cy="0"/>
+          <a:chOff x="0" y="0"/>
+          <a:chExt cx="0" cy="0"/>
+        </a:xfrm>
+      </p:grpSpPr>
+      <p:sp>
+        <p:nvSpPr>
+          <p:cNvPr id="2" name="Retângulo: Cantos Arredondados 1">
+            <a:extLst>
+              <a:ext uri="{FF2B5EF4-FFF2-40B4-BE49-F238E27FC236}">
+                <a16:creationId xmlns:a16="http://schemas.microsoft.com/office/drawing/2014/main" id="{3B887D0C-64A4-4E35-9C2B-B531B4F9C578}"/>
+              </a:ext>
+            </a:extLst>
+          </p:cNvPr>
+          <p:cNvSpPr/>
+          <p:nvPr/>
+        </p:nvSpPr>
+        <p:spPr>
+          <a:xfrm>
+            <a:off x="242639" y="241342"/>
+            <a:ext cx="3030648" cy="2316327"/>
+          </a:xfrm>
+          <a:prstGeom prst="roundRect">
+            <a:avLst/>
+          </a:prstGeom>
+          <a:solidFill>
+            <a:schemeClr val="bg1"/>
+          </a:solidFill>
+          <a:ln w="38100">
+            <a:solidFill>
+              <a:srgbClr val="37A8E9"/>
+            </a:solidFill>
+          </a:ln>
+        </p:spPr>
+        <p:style>
+          <a:lnRef idx="2">
+            <a:schemeClr val="accent1">
+              <a:shade val="50000"/>
+            </a:schemeClr>
+          </a:lnRef>
+          <a:fillRef idx="1">
+            <a:schemeClr val="accent1"/>
+          </a:fillRef>
+          <a:effectRef idx="0">
+            <a:schemeClr val="accent1"/>
+          </a:effectRef>
+          <a:fontRef idx="minor">
+            <a:schemeClr val="lt1"/>
+          </a:fontRef>
+        </p:style>
+        <p:txBody>
+          <a:bodyPr rtlCol="0" anchor="ctr"/>
+          <a:lstStyle/>
+          <a:p>
+            <a:pPr algn="ctr"/>
+            <a:endParaRPr lang="pt-BR" dirty="0">
+              <a:solidFill>
+                <a:schemeClr val="tx1"/>
+              </a:solidFill>
+            </a:endParaRPr>
+          </a:p>
+          <a:p>
+            <a:r>
+              <a:rPr lang="pt-BR" dirty="0">
+                <a:solidFill>
+                  <a:schemeClr val="tx1"/>
+                </a:solidFill>
+                <a:latin typeface="Comic Sans MS" panose="030F0702030302020204" pitchFamily="66" charset="0"/>
+              </a:rPr>
+              <a:t>#13</a:t>
+            </a:r>
+          </a:p>
+          <a:p>
+            <a:pPr algn="ctr"/>
+            <a:r>
+              <a:rPr lang="pt-BR" b="0" i="0" dirty="0">
+                <a:solidFill>
+                  <a:srgbClr val="000000"/>
+                </a:solidFill>
+                <a:effectLst/>
+                <a:latin typeface="Calibri" panose="020F0502020204030204" pitchFamily="34" charset="0"/>
+              </a:rPr>
+              <a:t>Eu como ADM preciso de uma lista simples de quantidade de transações e lucro líquido por estação para criar um relatório para meus superiores</a:t>
+            </a:r>
+            <a:endParaRPr lang="pt-BR" dirty="0">
+              <a:solidFill>
+                <a:schemeClr val="tx1"/>
+              </a:solidFill>
+              <a:latin typeface="Comic Sans MS" panose="030F0702030302020204" pitchFamily="66" charset="0"/>
+            </a:endParaRPr>
+          </a:p>
+        </p:txBody>
+      </p:sp>
+      <p:sp>
+        <p:nvSpPr>
+          <p:cNvPr id="3" name="Retângulo: Cantos Arredondados 2">
+            <a:extLst>
+              <a:ext uri="{FF2B5EF4-FFF2-40B4-BE49-F238E27FC236}">
+                <a16:creationId xmlns:a16="http://schemas.microsoft.com/office/drawing/2014/main" id="{FAB38A0B-6D3A-4760-91E8-2950B7454A65}"/>
+              </a:ext>
+            </a:extLst>
+          </p:cNvPr>
+          <p:cNvSpPr/>
+          <p:nvPr/>
+        </p:nvSpPr>
+        <p:spPr>
+          <a:xfrm>
+            <a:off x="3668328" y="244145"/>
+            <a:ext cx="3713134" cy="2316327"/>
+          </a:xfrm>
+          <a:prstGeom prst="roundRect">
+            <a:avLst/>
+          </a:prstGeom>
+          <a:solidFill>
+            <a:schemeClr val="bg1"/>
+          </a:solidFill>
+          <a:ln w="38100">
+            <a:solidFill>
+              <a:srgbClr val="37A8E9"/>
+            </a:solidFill>
+          </a:ln>
+        </p:spPr>
+        <p:style>
+          <a:lnRef idx="2">
+            <a:schemeClr val="accent1">
+              <a:shade val="50000"/>
+            </a:schemeClr>
+          </a:lnRef>
+          <a:fillRef idx="1">
+            <a:schemeClr val="accent1"/>
+          </a:fillRef>
+          <a:effectRef idx="0">
+            <a:schemeClr val="accent1"/>
+          </a:effectRef>
+          <a:fontRef idx="minor">
+            <a:schemeClr val="lt1"/>
+          </a:fontRef>
+        </p:style>
+        <p:txBody>
+          <a:bodyPr rtlCol="0" anchor="ctr"/>
+          <a:lstStyle/>
+          <a:p>
+            <a:pPr algn="ctr"/>
+            <a:endParaRPr lang="pt-BR" dirty="0">
+              <a:solidFill>
+                <a:schemeClr val="tx1"/>
+              </a:solidFill>
+            </a:endParaRPr>
+          </a:p>
+          <a:p>
+            <a:r>
+              <a:rPr lang="pt-BR" dirty="0">
+                <a:solidFill>
+                  <a:schemeClr val="tx1"/>
+                </a:solidFill>
+                <a:latin typeface="Comic Sans MS" panose="030F0702030302020204" pitchFamily="66" charset="0"/>
+              </a:rPr>
+              <a:t>#14</a:t>
+            </a:r>
+          </a:p>
+          <a:p>
+            <a:pPr algn="ctr"/>
+            <a:r>
+              <a:rPr lang="pt-BR" b="0" i="0" dirty="0">
+                <a:solidFill>
+                  <a:srgbClr val="000000"/>
+                </a:solidFill>
+                <a:effectLst/>
+                <a:latin typeface="Calibri" panose="020F0502020204030204" pitchFamily="34" charset="0"/>
+              </a:rPr>
+              <a:t>Eu como suporte, necessito de uma documentação ou manual de registro de soluções posteriores por outros colaboradores, para ter um guia padronizado do que fazer em determinadas situações</a:t>
+            </a:r>
+            <a:endParaRPr lang="pt-BR" dirty="0">
+              <a:solidFill>
+                <a:schemeClr val="tx1"/>
+              </a:solidFill>
+              <a:latin typeface="Comic Sans MS" panose="030F0702030302020204" pitchFamily="66" charset="0"/>
+            </a:endParaRPr>
+          </a:p>
+        </p:txBody>
+      </p:sp>
+      <p:sp>
+        <p:nvSpPr>
+          <p:cNvPr id="6" name="Retângulo: Cantos Arredondados 5">
+            <a:extLst>
+              <a:ext uri="{FF2B5EF4-FFF2-40B4-BE49-F238E27FC236}">
+                <a16:creationId xmlns:a16="http://schemas.microsoft.com/office/drawing/2014/main" id="{A1781199-8B3D-4B68-932D-B35A37918984}"/>
+              </a:ext>
+            </a:extLst>
+          </p:cNvPr>
+          <p:cNvSpPr/>
+          <p:nvPr/>
+        </p:nvSpPr>
+        <p:spPr>
+          <a:xfrm>
+            <a:off x="8200569" y="241342"/>
+            <a:ext cx="3554109" cy="2316327"/>
+          </a:xfrm>
+          <a:prstGeom prst="roundRect">
+            <a:avLst/>
+          </a:prstGeom>
+          <a:solidFill>
+            <a:schemeClr val="bg1"/>
+          </a:solidFill>
+          <a:ln w="38100">
+            <a:solidFill>
+              <a:srgbClr val="37A8E9"/>
+            </a:solidFill>
+          </a:ln>
+        </p:spPr>
+        <p:style>
+          <a:lnRef idx="2">
+            <a:schemeClr val="accent1">
+              <a:shade val="50000"/>
+            </a:schemeClr>
+          </a:lnRef>
+          <a:fillRef idx="1">
+            <a:schemeClr val="accent1"/>
+          </a:fillRef>
+          <a:effectRef idx="0">
+            <a:schemeClr val="accent1"/>
+          </a:effectRef>
+          <a:fontRef idx="minor">
+            <a:schemeClr val="lt1"/>
+          </a:fontRef>
+        </p:style>
+        <p:txBody>
+          <a:bodyPr rtlCol="0" anchor="ctr"/>
+          <a:lstStyle/>
+          <a:p>
+            <a:pPr algn="ctr"/>
+            <a:endParaRPr lang="pt-BR" dirty="0">
+              <a:solidFill>
+                <a:schemeClr val="tx1"/>
+              </a:solidFill>
+            </a:endParaRPr>
+          </a:p>
+          <a:p>
+            <a:r>
+              <a:rPr lang="pt-BR" dirty="0">
+                <a:solidFill>
+                  <a:schemeClr val="tx1"/>
+                </a:solidFill>
+                <a:latin typeface="Comic Sans MS" panose="030F0702030302020204" pitchFamily="66" charset="0"/>
+              </a:rPr>
+              <a:t>#</a:t>
+            </a:r>
+          </a:p>
+        </p:txBody>
+      </p:sp>
+      <p:sp>
+        <p:nvSpPr>
+          <p:cNvPr id="9" name="Retângulo: Cantos Arredondados 8">
+            <a:extLst>
+              <a:ext uri="{FF2B5EF4-FFF2-40B4-BE49-F238E27FC236}">
+                <a16:creationId xmlns:a16="http://schemas.microsoft.com/office/drawing/2014/main" id="{E8FC0A76-EF25-420E-B923-570D30D03D62}"/>
+              </a:ext>
+            </a:extLst>
+          </p:cNvPr>
+          <p:cNvSpPr/>
+          <p:nvPr/>
+        </p:nvSpPr>
+        <p:spPr>
+          <a:xfrm>
+            <a:off x="242639" y="2951413"/>
+            <a:ext cx="4137203" cy="2316327"/>
+          </a:xfrm>
+          <a:prstGeom prst="roundRect">
+            <a:avLst/>
+          </a:prstGeom>
+          <a:solidFill>
+            <a:schemeClr val="bg1"/>
+          </a:solidFill>
+          <a:ln w="38100">
+            <a:solidFill>
+              <a:srgbClr val="37A8E9"/>
+            </a:solidFill>
+          </a:ln>
+        </p:spPr>
+        <p:style>
+          <a:lnRef idx="2">
+            <a:schemeClr val="accent1">
+              <a:shade val="50000"/>
+            </a:schemeClr>
+          </a:lnRef>
+          <a:fillRef idx="1">
+            <a:schemeClr val="accent1"/>
+          </a:fillRef>
+          <a:effectRef idx="0">
+            <a:schemeClr val="accent1"/>
+          </a:effectRef>
+          <a:fontRef idx="minor">
+            <a:schemeClr val="lt1"/>
+          </a:fontRef>
+        </p:style>
+        <p:txBody>
+          <a:bodyPr rtlCol="0" anchor="ctr"/>
+          <a:lstStyle/>
+          <a:p>
+            <a:pPr algn="ctr"/>
+            <a:endParaRPr lang="pt-BR" dirty="0">
+              <a:solidFill>
+                <a:schemeClr val="tx1"/>
+              </a:solidFill>
+            </a:endParaRPr>
+          </a:p>
+          <a:p>
+            <a:r>
+              <a:rPr lang="pt-BR" dirty="0">
+                <a:solidFill>
+                  <a:schemeClr val="tx1"/>
+                </a:solidFill>
+                <a:latin typeface="Comic Sans MS" panose="030F0702030302020204" pitchFamily="66" charset="0"/>
+              </a:rPr>
+              <a:t>#</a:t>
+            </a:r>
+          </a:p>
+        </p:txBody>
+      </p:sp>
+      <p:sp>
+        <p:nvSpPr>
+          <p:cNvPr id="10" name="Retângulo: Cantos Arredondados 9">
+            <a:extLst>
+              <a:ext uri="{FF2B5EF4-FFF2-40B4-BE49-F238E27FC236}">
+                <a16:creationId xmlns:a16="http://schemas.microsoft.com/office/drawing/2014/main" id="{F6AA62DE-8289-4489-93B5-44173FDC1D7B}"/>
+              </a:ext>
+            </a:extLst>
+          </p:cNvPr>
+          <p:cNvSpPr/>
+          <p:nvPr/>
+        </p:nvSpPr>
+        <p:spPr>
+          <a:xfrm>
+            <a:off x="4675492" y="2951412"/>
+            <a:ext cx="3395082" cy="2316327"/>
+          </a:xfrm>
+          <a:prstGeom prst="roundRect">
+            <a:avLst/>
+          </a:prstGeom>
+          <a:solidFill>
+            <a:schemeClr val="bg1"/>
+          </a:solidFill>
+          <a:ln w="38100">
+            <a:solidFill>
+              <a:srgbClr val="37A8E9"/>
+            </a:solidFill>
+          </a:ln>
+        </p:spPr>
+        <p:style>
+          <a:lnRef idx="2">
+            <a:schemeClr val="accent1">
+              <a:shade val="50000"/>
+            </a:schemeClr>
+          </a:lnRef>
+          <a:fillRef idx="1">
+            <a:schemeClr val="accent1"/>
+          </a:fillRef>
+          <a:effectRef idx="0">
+            <a:schemeClr val="accent1"/>
+          </a:effectRef>
+          <a:fontRef idx="minor">
+            <a:schemeClr val="lt1"/>
+          </a:fontRef>
+        </p:style>
+        <p:txBody>
+          <a:bodyPr rtlCol="0" anchor="ctr"/>
+          <a:lstStyle/>
+          <a:p>
+            <a:pPr algn="ctr"/>
+            <a:endParaRPr lang="pt-BR" dirty="0">
+              <a:solidFill>
+                <a:schemeClr val="tx1"/>
+              </a:solidFill>
+            </a:endParaRPr>
+          </a:p>
+          <a:p>
+            <a:r>
+              <a:rPr lang="pt-BR" dirty="0">
+                <a:solidFill>
+                  <a:schemeClr val="tx1"/>
+                </a:solidFill>
+                <a:latin typeface="Comic Sans MS" panose="030F0702030302020204" pitchFamily="66" charset="0"/>
+              </a:rPr>
+              <a:t>#</a:t>
+            </a:r>
+          </a:p>
+        </p:txBody>
+      </p:sp>
+      <p:sp>
+        <p:nvSpPr>
+          <p:cNvPr id="11" name="Retângulo: Cantos Arredondados 10">
+            <a:extLst>
+              <a:ext uri="{FF2B5EF4-FFF2-40B4-BE49-F238E27FC236}">
+                <a16:creationId xmlns:a16="http://schemas.microsoft.com/office/drawing/2014/main" id="{51A34366-0D07-44AA-972D-23D7C44EB36D}"/>
+              </a:ext>
+            </a:extLst>
+          </p:cNvPr>
+          <p:cNvSpPr/>
+          <p:nvPr/>
+        </p:nvSpPr>
+        <p:spPr>
+          <a:xfrm>
+            <a:off x="8462299" y="2951412"/>
+            <a:ext cx="3487062" cy="2316327"/>
+          </a:xfrm>
+          <a:prstGeom prst="roundRect">
+            <a:avLst/>
+          </a:prstGeom>
+          <a:solidFill>
+            <a:schemeClr val="bg1"/>
+          </a:solidFill>
+          <a:ln w="38100">
+            <a:solidFill>
+              <a:srgbClr val="37A8E9"/>
+            </a:solidFill>
+          </a:ln>
+        </p:spPr>
+        <p:style>
+          <a:lnRef idx="2">
+            <a:schemeClr val="accent1">
+              <a:shade val="50000"/>
+            </a:schemeClr>
+          </a:lnRef>
+          <a:fillRef idx="1">
+            <a:schemeClr val="accent1"/>
+          </a:fillRef>
+          <a:effectRef idx="0">
+            <a:schemeClr val="accent1"/>
+          </a:effectRef>
+          <a:fontRef idx="minor">
+            <a:schemeClr val="lt1"/>
+          </a:fontRef>
+        </p:style>
+        <p:txBody>
+          <a:bodyPr rtlCol="0" anchor="ctr"/>
+          <a:lstStyle/>
+          <a:p>
+            <a:pPr algn="ctr"/>
+            <a:endParaRPr lang="pt-BR" dirty="0">
+              <a:solidFill>
+                <a:schemeClr val="tx1"/>
+              </a:solidFill>
+            </a:endParaRPr>
+          </a:p>
+          <a:p>
+            <a:r>
+              <a:rPr lang="pt-BR" dirty="0">
+                <a:solidFill>
+                  <a:schemeClr val="tx1"/>
+                </a:solidFill>
+                <a:latin typeface="Comic Sans MS" panose="030F0702030302020204" pitchFamily="66" charset="0"/>
+              </a:rPr>
+              <a:t>#</a:t>
+            </a:r>
+          </a:p>
+        </p:txBody>
+      </p:sp>
+    </p:spTree>
+    <p:extLst>
+      <p:ext uri="{BB962C8B-B14F-4D97-AF65-F5344CB8AC3E}">
+        <p14:creationId xmlns:p14="http://schemas.microsoft.com/office/powerpoint/2010/main" val="2885614566"/>
       </p:ext>
     </p:extLst>
   </p:cSld>
@@ -4457,16 +5534,16 @@
 <file path=customXml/itemProps3.xml><?xml version="1.0" encoding="utf-8"?>
 <ds:datastoreItem xmlns:ds="http://schemas.openxmlformats.org/officeDocument/2006/customXml" ds:itemID="{16F5BE80-B5BE-46B2-A8FF-4191F8B8B439}">
   <ds:schemaRefs>
-    <ds:schemaRef ds:uri="http://purl.org/dc/dcmitype/"/>
+    <ds:schemaRef ds:uri="http://schemas.microsoft.com/office/2006/documentManagement/types"/>
+    <ds:schemaRef ds:uri="http://purl.org/dc/elements/1.1/"/>
     <ds:schemaRef ds:uri="c14df721-83d0-478d-aefc-5e63513a87b4"/>
-    <ds:schemaRef ds:uri="http://purl.org/dc/terms/"/>
-    <ds:schemaRef ds:uri="http://schemas.microsoft.com/office/2006/documentManagement/types"/>
     <ds:schemaRef ds:uri="659efe37-a1ff-41bd-b7f7-e81fdb610ca5"/>
+    <ds:schemaRef ds:uri="http://schemas.microsoft.com/office/2006/metadata/properties"/>
     <ds:schemaRef ds:uri="http://schemas.microsoft.com/office/infopath/2007/PartnerControls"/>
-    <ds:schemaRef ds:uri="http://schemas.microsoft.com/office/2006/metadata/properties"/>
-    <ds:schemaRef ds:uri="http://purl.org/dc/elements/1.1/"/>
     <ds:schemaRef ds:uri="http://schemas.openxmlformats.org/package/2006/metadata/core-properties"/>
     <ds:schemaRef ds:uri="http://www.w3.org/XML/1998/namespace"/>
+    <ds:schemaRef ds:uri="http://purl.org/dc/dcmitype/"/>
+    <ds:schemaRef ds:uri="http://purl.org/dc/terms/"/>
   </ds:schemaRefs>
 </ds:datastoreItem>
 </file>
</xml_diff>